<commit_message>
minor changes to 3 and 7
</commit_message>
<xml_diff>
--- a/Complimentary Course Content/Module3/Lessons/Module3_Lesson01 Mobile Development Survey.pptx
+++ b/Complimentary Course Content/Module3/Lessons/Module3_Lesson01 Mobile Development Survey.pptx
@@ -137,7 +137,7 @@
   </p:defaultTextStyle>
   <p:extLst>
     <p:ext uri="{EFAFB233-063F-42B5-8137-9DF3F51BA10A}">
-      <p15:sldGuideLst xmlns="" xmlns:p15="http://schemas.microsoft.com/office/powerpoint/2012/main">
+      <p15:sldGuideLst xmlns:p15="http://schemas.microsoft.com/office/powerpoint/2012/main" xmlns="">
         <p15:guide id="1" orient="horz" pos="2184" userDrawn="1">
           <p15:clr>
             <a:srgbClr val="A4A3A4"/>
@@ -261,7 +261,7 @@
             <a:fld id="{49B60EF2-7028-489F-85D8-FE86CD7CF2A0}" type="datetimeFigureOut">
               <a:rPr lang="en-US" smtClean="0"/>
               <a:pPr/>
-              <a:t>6/28/16</a:t>
+              <a:t>6/30/16</a:t>
             </a:fld>
             <a:endParaRPr lang="en-US"/>
           </a:p>
@@ -5807,7 +5807,7 @@
             <a:fld id="{0459C166-16D3-4A25-A2F8-C51E0E346B22}" type="datetimeFigureOut">
               <a:rPr lang="en-US" smtClean="0"/>
               <a:pPr/>
-              <a:t>6/28/16</a:t>
+              <a:t>6/30/16</a:t>
             </a:fld>
             <a:endParaRPr lang="en-US"/>
           </a:p>
@@ -5977,7 +5977,7 @@
             <a:fld id="{0459C166-16D3-4A25-A2F8-C51E0E346B22}" type="datetimeFigureOut">
               <a:rPr lang="en-US" smtClean="0"/>
               <a:pPr/>
-              <a:t>6/28/16</a:t>
+              <a:t>6/30/16</a:t>
             </a:fld>
             <a:endParaRPr lang="en-US"/>
           </a:p>
@@ -6157,7 +6157,7 @@
             <a:fld id="{0459C166-16D3-4A25-A2F8-C51E0E346B22}" type="datetimeFigureOut">
               <a:rPr lang="en-US" smtClean="0"/>
               <a:pPr/>
-              <a:t>6/28/16</a:t>
+              <a:t>6/30/16</a:t>
             </a:fld>
             <a:endParaRPr lang="en-US"/>
           </a:p>
@@ -6327,7 +6327,7 @@
             <a:fld id="{0459C166-16D3-4A25-A2F8-C51E0E346B22}" type="datetimeFigureOut">
               <a:rPr lang="en-US" smtClean="0"/>
               <a:pPr/>
-              <a:t>6/28/16</a:t>
+              <a:t>6/30/16</a:t>
             </a:fld>
             <a:endParaRPr lang="en-US"/>
           </a:p>
@@ -6594,7 +6594,7 @@
             <a:fld id="{0459C166-16D3-4A25-A2F8-C51E0E346B22}" type="datetimeFigureOut">
               <a:rPr lang="en-US" smtClean="0"/>
               <a:pPr/>
-              <a:t>6/28/16</a:t>
+              <a:t>6/30/16</a:t>
             </a:fld>
             <a:endParaRPr lang="en-US"/>
           </a:p>
@@ -6841,7 +6841,7 @@
             <a:fld id="{0459C166-16D3-4A25-A2F8-C51E0E346B22}" type="datetimeFigureOut">
               <a:rPr lang="en-US" smtClean="0"/>
               <a:pPr/>
-              <a:t>6/28/16</a:t>
+              <a:t>6/30/16</a:t>
             </a:fld>
             <a:endParaRPr lang="en-US"/>
           </a:p>
@@ -7207,7 +7207,7 @@
             <a:fld id="{0459C166-16D3-4A25-A2F8-C51E0E346B22}" type="datetimeFigureOut">
               <a:rPr lang="en-US" smtClean="0"/>
               <a:pPr/>
-              <a:t>6/28/16</a:t>
+              <a:t>6/30/16</a:t>
             </a:fld>
             <a:endParaRPr lang="en-US"/>
           </a:p>
@@ -7326,7 +7326,7 @@
             <a:fld id="{0459C166-16D3-4A25-A2F8-C51E0E346B22}" type="datetimeFigureOut">
               <a:rPr lang="en-US" smtClean="0"/>
               <a:pPr/>
-              <a:t>6/28/16</a:t>
+              <a:t>6/30/16</a:t>
             </a:fld>
             <a:endParaRPr lang="en-US"/>
           </a:p>
@@ -7423,7 +7423,7 @@
             <a:fld id="{0459C166-16D3-4A25-A2F8-C51E0E346B22}" type="datetimeFigureOut">
               <a:rPr lang="en-US" smtClean="0"/>
               <a:pPr/>
-              <a:t>6/28/16</a:t>
+              <a:t>6/30/16</a:t>
             </a:fld>
             <a:endParaRPr lang="en-US"/>
           </a:p>
@@ -7700,7 +7700,7 @@
             <a:fld id="{0459C166-16D3-4A25-A2F8-C51E0E346B22}" type="datetimeFigureOut">
               <a:rPr lang="en-US" smtClean="0"/>
               <a:pPr/>
-              <a:t>6/28/16</a:t>
+              <a:t>6/30/16</a:t>
             </a:fld>
             <a:endParaRPr lang="en-US"/>
           </a:p>
@@ -7954,7 +7954,7 @@
             <a:fld id="{0459C166-16D3-4A25-A2F8-C51E0E346B22}" type="datetimeFigureOut">
               <a:rPr lang="en-US" smtClean="0"/>
               <a:pPr/>
-              <a:t>6/28/16</a:t>
+              <a:t>6/30/16</a:t>
             </a:fld>
             <a:endParaRPr lang="en-US"/>
           </a:p>
@@ -8167,7 +8167,7 @@
             <a:fld id="{0459C166-16D3-4A25-A2F8-C51E0E346B22}" type="datetimeFigureOut">
               <a:rPr lang="en-US" smtClean="0"/>
               <a:pPr/>
-              <a:t>6/28/16</a:t>
+              <a:t>6/30/16</a:t>
             </a:fld>
             <a:endParaRPr lang="en-US"/>
           </a:p>
@@ -13245,7 +13245,7 @@
           <p:nvPr>
             <p:extLst>
               <p:ext uri="{D42A27DB-BD31-4B8C-83A1-F6EECF244321}">
-                <p14:modId xmlns:p14="http://schemas.microsoft.com/office/powerpoint/2010/main" val="2418348726"/>
+                <p14:modId xmlns:p14="http://schemas.microsoft.com/office/powerpoint/2010/main" val="652256650"/>
               </p:ext>
             </p:extLst>
           </p:nvPr>
@@ -13264,14 +13264,14 @@
                 <a:gridCol w="5287266">
                   <a:extLst>
                     <a:ext uri="{9D8B030D-6E8A-4147-A177-3AD203B41FA5}">
-                      <a16:colId xmlns="" xmlns:a16="http://schemas.microsoft.com/office/drawing/2014/main" val="48614039"/>
+                      <a16:colId xmlns:a16="http://schemas.microsoft.com/office/drawing/2014/main" xmlns="" val="48614039"/>
                     </a:ext>
                   </a:extLst>
                 </a:gridCol>
                 <a:gridCol w="5287266">
                   <a:extLst>
                     <a:ext uri="{9D8B030D-6E8A-4147-A177-3AD203B41FA5}">
-                      <a16:colId xmlns="" xmlns:a16="http://schemas.microsoft.com/office/drawing/2014/main" val="1124546490"/>
+                      <a16:colId xmlns:a16="http://schemas.microsoft.com/office/drawing/2014/main" xmlns="" val="1124546490"/>
                     </a:ext>
                   </a:extLst>
                 </a:gridCol>
@@ -13284,14 +13284,14 @@
                     <a:p>
                       <a:pPr algn="ctr"/>
                       <a:r>
-                        <a:rPr lang="en-US" sz="2000" b="0" baseline="0" dirty="0">
+                        <a:rPr lang="en-US" sz="2000" b="1" baseline="0" dirty="0">
                           <a:solidFill>
                             <a:schemeClr val="bg1"/>
                           </a:solidFill>
                         </a:rPr>
                         <a:t>Development Framework</a:t>
                       </a:r>
-                      <a:endParaRPr lang="en-US" sz="2000" b="0" dirty="0">
+                      <a:endParaRPr lang="en-US" sz="2000" b="1" dirty="0">
                         <a:solidFill>
                           <a:schemeClr val="bg1"/>
                         </a:solidFill>
@@ -13341,7 +13341,7 @@
                 </a:tc>
                 <a:extLst>
                   <a:ext uri="{0D108BD9-81ED-4DB2-BD59-A6C34878D82A}">
-                    <a16:rowId xmlns="" xmlns:a16="http://schemas.microsoft.com/office/drawing/2014/main" val="679667022"/>
+                    <a16:rowId xmlns:a16="http://schemas.microsoft.com/office/drawing/2014/main" xmlns="" val="679667022"/>
                   </a:ext>
                 </a:extLst>
               </a:tr>
@@ -13353,10 +13353,10 @@
                     <a:p>
                       <a:pPr algn="l"/>
                       <a:r>
-                        <a:rPr lang="en-US" sz="2000" dirty="0" err="1"/>
+                        <a:rPr lang="en-US" sz="2000" b="1" dirty="0" err="1"/>
                         <a:t>Xamarin</a:t>
                       </a:r>
-                      <a:endParaRPr lang="en-US" sz="2000" dirty="0"/>
+                      <a:endParaRPr lang="en-US" sz="2000" b="1" dirty="0"/>
                     </a:p>
                   </a:txBody>
                   <a:tcPr>
@@ -13389,7 +13389,7 @@
                 </a:tc>
                 <a:extLst>
                   <a:ext uri="{0D108BD9-81ED-4DB2-BD59-A6C34878D82A}">
-                    <a16:rowId xmlns="" xmlns:a16="http://schemas.microsoft.com/office/drawing/2014/main" val="2034482246"/>
+                    <a16:rowId xmlns:a16="http://schemas.microsoft.com/office/drawing/2014/main" xmlns="" val="2034482246"/>
                   </a:ext>
                 </a:extLst>
               </a:tr>
@@ -13401,18 +13401,18 @@
                     <a:p>
                       <a:pPr algn="l"/>
                       <a:r>
-                        <a:rPr lang="en-US" sz="2000" dirty="0"/>
+                        <a:rPr lang="en-US" sz="2000" b="1" dirty="0"/>
                         <a:t>Titanium, </a:t>
                       </a:r>
                       <a:r>
-                        <a:rPr lang="en-US" sz="2000" dirty="0" err="1"/>
+                        <a:rPr lang="en-US" sz="2000" b="1" dirty="0" err="1"/>
                         <a:t>NativeScript</a:t>
                       </a:r>
                       <a:r>
-                        <a:rPr lang="en-US" sz="2000" baseline="0" dirty="0"/>
+                        <a:rPr lang="en-US" sz="2000" b="1" baseline="0" dirty="0"/>
                         <a:t> &amp; React Native</a:t>
                       </a:r>
-                      <a:endParaRPr lang="en-US" sz="2000" dirty="0"/>
+                      <a:endParaRPr lang="en-US" sz="2000" b="1" dirty="0"/>
                     </a:p>
                   </a:txBody>
                   <a:tcPr>
@@ -13445,7 +13445,7 @@
                 </a:tc>
                 <a:extLst>
                   <a:ext uri="{0D108BD9-81ED-4DB2-BD59-A6C34878D82A}">
-                    <a16:rowId xmlns="" xmlns:a16="http://schemas.microsoft.com/office/drawing/2014/main" val="682465758"/>
+                    <a16:rowId xmlns:a16="http://schemas.microsoft.com/office/drawing/2014/main" xmlns="" val="682465758"/>
                   </a:ext>
                 </a:extLst>
               </a:tr>
@@ -13457,7 +13457,7 @@
                     <a:p>
                       <a:pPr algn="l"/>
                       <a:r>
-                        <a:rPr lang="en-US" sz="2000" dirty="0"/>
+                        <a:rPr lang="en-US" sz="2000" b="1" dirty="0"/>
                         <a:t>Cordova</a:t>
                       </a:r>
                     </a:p>
@@ -13497,7 +13497,7 @@
                 </a:tc>
                 <a:extLst>
                   <a:ext uri="{0D108BD9-81ED-4DB2-BD59-A6C34878D82A}">
-                    <a16:rowId xmlns="" xmlns:a16="http://schemas.microsoft.com/office/drawing/2014/main" val="4230228483"/>
+                    <a16:rowId xmlns:a16="http://schemas.microsoft.com/office/drawing/2014/main" xmlns="" val="4230228483"/>
                   </a:ext>
                 </a:extLst>
               </a:tr>
@@ -16908,7 +16908,7 @@
           <p:nvPr>
             <p:extLst>
               <p:ext uri="{D42A27DB-BD31-4B8C-83A1-F6EECF244321}">
-                <p14:modId xmlns:p14="http://schemas.microsoft.com/office/powerpoint/2010/main" val="2437213304"/>
+                <p14:modId xmlns:p14="http://schemas.microsoft.com/office/powerpoint/2010/main" val="874510127"/>
               </p:ext>
             </p:extLst>
           </p:nvPr>
@@ -16927,21 +16927,21 @@
                 <a:gridCol w="2410409">
                   <a:extLst>
                     <a:ext uri="{9D8B030D-6E8A-4147-A177-3AD203B41FA5}">
-                      <a16:colId xmlns="" xmlns:a16="http://schemas.microsoft.com/office/drawing/2014/main" val="48614039"/>
+                      <a16:colId xmlns:a16="http://schemas.microsoft.com/office/drawing/2014/main" xmlns="" val="48614039"/>
                     </a:ext>
                   </a:extLst>
                 </a:gridCol>
                 <a:gridCol w="4106472">
                   <a:extLst>
                     <a:ext uri="{9D8B030D-6E8A-4147-A177-3AD203B41FA5}">
-                      <a16:colId xmlns="" xmlns:a16="http://schemas.microsoft.com/office/drawing/2014/main" val="1124546490"/>
+                      <a16:colId xmlns:a16="http://schemas.microsoft.com/office/drawing/2014/main" xmlns="" val="1124546490"/>
                     </a:ext>
                   </a:extLst>
                 </a:gridCol>
                 <a:gridCol w="4352925">
                   <a:extLst>
                     <a:ext uri="{9D8B030D-6E8A-4147-A177-3AD203B41FA5}">
-                      <a16:colId xmlns="" xmlns:a16="http://schemas.microsoft.com/office/drawing/2014/main" val="2996711397"/>
+                      <a16:colId xmlns:a16="http://schemas.microsoft.com/office/drawing/2014/main" xmlns="" val="2996711397"/>
                     </a:ext>
                   </a:extLst>
                 </a:gridCol>
@@ -16954,14 +16954,14 @@
                     <a:p>
                       <a:pPr algn="ctr"/>
                       <a:r>
-                        <a:rPr lang="en-US" sz="2000" b="0" baseline="0" dirty="0">
+                        <a:rPr lang="en-US" sz="2000" b="1" baseline="0" dirty="0">
                           <a:solidFill>
                             <a:schemeClr val="bg1"/>
                           </a:solidFill>
                         </a:rPr>
                         <a:t>Framework</a:t>
                       </a:r>
-                      <a:endParaRPr lang="en-US" sz="2000" b="0" dirty="0">
+                      <a:endParaRPr lang="en-US" sz="2000" b="1" dirty="0">
                         <a:solidFill>
                           <a:schemeClr val="bg1"/>
                         </a:solidFill>
@@ -17020,7 +17020,7 @@
                 </a:tc>
                 <a:extLst>
                   <a:ext uri="{0D108BD9-81ED-4DB2-BD59-A6C34878D82A}">
-                    <a16:rowId xmlns="" xmlns:a16="http://schemas.microsoft.com/office/drawing/2014/main" val="679667022"/>
+                    <a16:rowId xmlns:a16="http://schemas.microsoft.com/office/drawing/2014/main" xmlns="" val="679667022"/>
                   </a:ext>
                 </a:extLst>
               </a:tr>
@@ -17032,10 +17032,10 @@
                     <a:p>
                       <a:pPr algn="l"/>
                       <a:r>
-                        <a:rPr lang="en-US" sz="2000" dirty="0" err="1"/>
+                        <a:rPr lang="en-US" sz="2000" b="1" dirty="0" err="1"/>
                         <a:t>Xamarin</a:t>
                       </a:r>
-                      <a:endParaRPr lang="en-US" sz="2000" dirty="0"/>
+                      <a:endParaRPr lang="en-US" sz="2000" b="1" dirty="0"/>
                     </a:p>
                   </a:txBody>
                   <a:tcPr>
@@ -17106,7 +17106,7 @@
                 </a:tc>
                 <a:extLst>
                   <a:ext uri="{0D108BD9-81ED-4DB2-BD59-A6C34878D82A}">
-                    <a16:rowId xmlns="" xmlns:a16="http://schemas.microsoft.com/office/drawing/2014/main" val="2034482246"/>
+                    <a16:rowId xmlns:a16="http://schemas.microsoft.com/office/drawing/2014/main" xmlns="" val="2034482246"/>
                   </a:ext>
                 </a:extLst>
               </a:tr>
@@ -17118,25 +17118,25 @@
                     <a:p>
                       <a:pPr algn="l"/>
                       <a:r>
-                        <a:rPr lang="en-US" sz="2000" dirty="0"/>
+                        <a:rPr lang="en-US" sz="2000" b="1" dirty="0"/>
                         <a:t>Titanium, </a:t>
                       </a:r>
                       <a:r>
-                        <a:rPr lang="en-US" sz="2000" dirty="0" err="1"/>
+                        <a:rPr lang="en-US" sz="2000" b="1" dirty="0" err="1"/>
                         <a:t>NativeScript</a:t>
                       </a:r>
                       <a:r>
-                        <a:rPr lang="en-US" sz="2000" baseline="0" dirty="0"/>
+                        <a:rPr lang="en-US" sz="2000" b="1" baseline="0" dirty="0"/>
                         <a:t>, </a:t>
                       </a:r>
                       <a:br>
-                        <a:rPr lang="en-US" sz="2000" baseline="0" dirty="0"/>
+                        <a:rPr lang="en-US" sz="2000" b="1" baseline="0" dirty="0"/>
                       </a:br>
                       <a:r>
-                        <a:rPr lang="en-US" sz="2000" baseline="0" dirty="0"/>
+                        <a:rPr lang="en-US" sz="2000" b="1" baseline="0" dirty="0"/>
                         <a:t>React Native</a:t>
                       </a:r>
-                      <a:endParaRPr lang="en-US" sz="2000" dirty="0"/>
+                      <a:endParaRPr lang="en-US" sz="2000" b="1" dirty="0"/>
                     </a:p>
                   </a:txBody>
                   <a:tcPr>
@@ -17218,7 +17218,7 @@
                 </a:tc>
                 <a:extLst>
                   <a:ext uri="{0D108BD9-81ED-4DB2-BD59-A6C34878D82A}">
-                    <a16:rowId xmlns="" xmlns:a16="http://schemas.microsoft.com/office/drawing/2014/main" val="682465758"/>
+                    <a16:rowId xmlns:a16="http://schemas.microsoft.com/office/drawing/2014/main" xmlns="" val="682465758"/>
                   </a:ext>
                 </a:extLst>
               </a:tr>
@@ -17230,7 +17230,7 @@
                     <a:p>
                       <a:pPr algn="l"/>
                       <a:r>
-                        <a:rPr lang="en-US" sz="2000" dirty="0"/>
+                        <a:rPr lang="en-US" sz="2000" b="1" dirty="0"/>
                         <a:t>Cordova</a:t>
                       </a:r>
                     </a:p>
@@ -17304,7 +17304,7 @@
                 </a:tc>
                 <a:extLst>
                   <a:ext uri="{0D108BD9-81ED-4DB2-BD59-A6C34878D82A}">
-                    <a16:rowId xmlns="" xmlns:a16="http://schemas.microsoft.com/office/drawing/2014/main" val="4230228483"/>
+                    <a16:rowId xmlns:a16="http://schemas.microsoft.com/office/drawing/2014/main" xmlns="" val="4230228483"/>
                   </a:ext>
                 </a:extLst>
               </a:tr>
@@ -22907,7 +22907,7 @@
   <a:extraClrSchemeLst/>
   <a:extLst>
     <a:ext uri="{05A4C25C-085E-4340-85A3-A5531E510DB2}">
-      <thm15:themeFamily xmlns="" xmlns:thm15="http://schemas.microsoft.com/office/thememl/2012/main" name="Office Theme" id="{62F939B6-93AF-4DB8-9C6B-D6C7DFDC589F}" vid="{4A3C46E8-61CC-4603-A589-7422A47A8E4A}"/>
+      <thm15:themeFamily xmlns:thm15="http://schemas.microsoft.com/office/thememl/2012/main" xmlns="" name="Office Theme" id="{62F939B6-93AF-4DB8-9C6B-D6C7DFDC589F}" vid="{4A3C46E8-61CC-4603-A589-7422A47A8E4A}"/>
     </a:ext>
   </a:extLst>
 </a:theme>
@@ -23202,7 +23202,7 @@
   <a:extraClrSchemeLst/>
   <a:extLst>
     <a:ext uri="{05A4C25C-085E-4340-85A3-A5531E510DB2}">
-      <thm15:themeFamily xmlns="" xmlns:thm15="http://schemas.microsoft.com/office/thememl/2012/main" name="Office Theme" id="{62F939B6-93AF-4DB8-9C6B-D6C7DFDC589F}" vid="{4A3C46E8-61CC-4603-A589-7422A47A8E4A}"/>
+      <thm15:themeFamily xmlns:thm15="http://schemas.microsoft.com/office/thememl/2012/main" xmlns="" name="Office Theme" id="{62F939B6-93AF-4DB8-9C6B-D6C7DFDC589F}" vid="{4A3C46E8-61CC-4603-A589-7422A47A8E4A}"/>
     </a:ext>
   </a:extLst>
 </a:theme>

</xml_diff>

<commit_message>
initial changes based on feedback
</commit_message>
<xml_diff>
--- a/Complimentary Course Content/Module3/Lessons/Module3_Lesson01 Mobile Development Survey.pptx
+++ b/Complimentary Course Content/Module3/Lessons/Module3_Lesson01 Mobile Development Survey.pptx
@@ -137,7 +137,7 @@
   </p:defaultTextStyle>
   <p:extLst>
     <p:ext uri="{EFAFB233-063F-42B5-8137-9DF3F51BA10A}">
-      <p15:sldGuideLst xmlns:p15="http://schemas.microsoft.com/office/powerpoint/2012/main" xmlns="">
+      <p15:sldGuideLst xmlns="" xmlns:p15="http://schemas.microsoft.com/office/powerpoint/2012/main">
         <p15:guide id="1" orient="horz" pos="2184" userDrawn="1">
           <p15:clr>
             <a:srgbClr val="A4A3A4"/>
@@ -13264,14 +13264,14 @@
                 <a:gridCol w="5287266">
                   <a:extLst>
                     <a:ext uri="{9D8B030D-6E8A-4147-A177-3AD203B41FA5}">
-                      <a16:colId xmlns:a16="http://schemas.microsoft.com/office/drawing/2014/main" xmlns="" val="48614039"/>
+                      <a16:colId xmlns="" xmlns:a16="http://schemas.microsoft.com/office/drawing/2014/main" val="48614039"/>
                     </a:ext>
                   </a:extLst>
                 </a:gridCol>
                 <a:gridCol w="5287266">
                   <a:extLst>
                     <a:ext uri="{9D8B030D-6E8A-4147-A177-3AD203B41FA5}">
-                      <a16:colId xmlns:a16="http://schemas.microsoft.com/office/drawing/2014/main" xmlns="" val="1124546490"/>
+                      <a16:colId xmlns="" xmlns:a16="http://schemas.microsoft.com/office/drawing/2014/main" val="1124546490"/>
                     </a:ext>
                   </a:extLst>
                 </a:gridCol>
@@ -13341,7 +13341,7 @@
                 </a:tc>
                 <a:extLst>
                   <a:ext uri="{0D108BD9-81ED-4DB2-BD59-A6C34878D82A}">
-                    <a16:rowId xmlns:a16="http://schemas.microsoft.com/office/drawing/2014/main" xmlns="" val="679667022"/>
+                    <a16:rowId xmlns="" xmlns:a16="http://schemas.microsoft.com/office/drawing/2014/main" val="679667022"/>
                   </a:ext>
                 </a:extLst>
               </a:tr>
@@ -13389,7 +13389,7 @@
                 </a:tc>
                 <a:extLst>
                   <a:ext uri="{0D108BD9-81ED-4DB2-BD59-A6C34878D82A}">
-                    <a16:rowId xmlns:a16="http://schemas.microsoft.com/office/drawing/2014/main" xmlns="" val="2034482246"/>
+                    <a16:rowId xmlns="" xmlns:a16="http://schemas.microsoft.com/office/drawing/2014/main" val="2034482246"/>
                   </a:ext>
                 </a:extLst>
               </a:tr>
@@ -13445,7 +13445,7 @@
                 </a:tc>
                 <a:extLst>
                   <a:ext uri="{0D108BD9-81ED-4DB2-BD59-A6C34878D82A}">
-                    <a16:rowId xmlns:a16="http://schemas.microsoft.com/office/drawing/2014/main" xmlns="" val="682465758"/>
+                    <a16:rowId xmlns="" xmlns:a16="http://schemas.microsoft.com/office/drawing/2014/main" val="682465758"/>
                   </a:ext>
                 </a:extLst>
               </a:tr>
@@ -13497,7 +13497,7 @@
                 </a:tc>
                 <a:extLst>
                   <a:ext uri="{0D108BD9-81ED-4DB2-BD59-A6C34878D82A}">
-                    <a16:rowId xmlns:a16="http://schemas.microsoft.com/office/drawing/2014/main" xmlns="" val="4230228483"/>
+                    <a16:rowId xmlns="" xmlns:a16="http://schemas.microsoft.com/office/drawing/2014/main" val="4230228483"/>
                   </a:ext>
                 </a:extLst>
               </a:tr>
@@ -16927,21 +16927,21 @@
                 <a:gridCol w="2410409">
                   <a:extLst>
                     <a:ext uri="{9D8B030D-6E8A-4147-A177-3AD203B41FA5}">
-                      <a16:colId xmlns:a16="http://schemas.microsoft.com/office/drawing/2014/main" xmlns="" val="48614039"/>
+                      <a16:colId xmlns="" xmlns:a16="http://schemas.microsoft.com/office/drawing/2014/main" val="48614039"/>
                     </a:ext>
                   </a:extLst>
                 </a:gridCol>
                 <a:gridCol w="4106472">
                   <a:extLst>
                     <a:ext uri="{9D8B030D-6E8A-4147-A177-3AD203B41FA5}">
-                      <a16:colId xmlns:a16="http://schemas.microsoft.com/office/drawing/2014/main" xmlns="" val="1124546490"/>
+                      <a16:colId xmlns="" xmlns:a16="http://schemas.microsoft.com/office/drawing/2014/main" val="1124546490"/>
                     </a:ext>
                   </a:extLst>
                 </a:gridCol>
                 <a:gridCol w="4352925">
                   <a:extLst>
                     <a:ext uri="{9D8B030D-6E8A-4147-A177-3AD203B41FA5}">
-                      <a16:colId xmlns:a16="http://schemas.microsoft.com/office/drawing/2014/main" xmlns="" val="2996711397"/>
+                      <a16:colId xmlns="" xmlns:a16="http://schemas.microsoft.com/office/drawing/2014/main" val="2996711397"/>
                     </a:ext>
                   </a:extLst>
                 </a:gridCol>
@@ -17020,7 +17020,7 @@
                 </a:tc>
                 <a:extLst>
                   <a:ext uri="{0D108BD9-81ED-4DB2-BD59-A6C34878D82A}">
-                    <a16:rowId xmlns:a16="http://schemas.microsoft.com/office/drawing/2014/main" xmlns="" val="679667022"/>
+                    <a16:rowId xmlns="" xmlns:a16="http://schemas.microsoft.com/office/drawing/2014/main" val="679667022"/>
                   </a:ext>
                 </a:extLst>
               </a:tr>
@@ -17106,7 +17106,7 @@
                 </a:tc>
                 <a:extLst>
                   <a:ext uri="{0D108BD9-81ED-4DB2-BD59-A6C34878D82A}">
-                    <a16:rowId xmlns:a16="http://schemas.microsoft.com/office/drawing/2014/main" xmlns="" val="2034482246"/>
+                    <a16:rowId xmlns="" xmlns:a16="http://schemas.microsoft.com/office/drawing/2014/main" val="2034482246"/>
                   </a:ext>
                 </a:extLst>
               </a:tr>
@@ -17218,7 +17218,7 @@
                 </a:tc>
                 <a:extLst>
                   <a:ext uri="{0D108BD9-81ED-4DB2-BD59-A6C34878D82A}">
-                    <a16:rowId xmlns:a16="http://schemas.microsoft.com/office/drawing/2014/main" xmlns="" val="682465758"/>
+                    <a16:rowId xmlns="" xmlns:a16="http://schemas.microsoft.com/office/drawing/2014/main" val="682465758"/>
                   </a:ext>
                 </a:extLst>
               </a:tr>
@@ -17304,7 +17304,7 @@
                 </a:tc>
                 <a:extLst>
                   <a:ext uri="{0D108BD9-81ED-4DB2-BD59-A6C34878D82A}">
-                    <a16:rowId xmlns:a16="http://schemas.microsoft.com/office/drawing/2014/main" xmlns="" val="4230228483"/>
+                    <a16:rowId xmlns="" xmlns:a16="http://schemas.microsoft.com/office/drawing/2014/main" val="4230228483"/>
                   </a:ext>
                 </a:extLst>
               </a:tr>
@@ -20986,21 +20986,42 @@
                   <a:schemeClr val="tx1"/>
                 </a:solidFill>
               </a:rPr>
-              <a:t>Android: Java, Android Studio, and Eclipse</a:t>
-            </a:r>
+              <a:t>Android: Java, </a:t>
+            </a:r>
+            <a:r>
+              <a:rPr lang="en-US" sz="2800" dirty="0" smtClean="0">
+                <a:solidFill>
+                  <a:schemeClr val="tx1"/>
+                </a:solidFill>
+              </a:rPr>
+              <a:t>and Android Studio</a:t>
+            </a:r>
+            <a:endParaRPr lang="en-US" sz="2800" dirty="0">
+              <a:solidFill>
+                <a:schemeClr val="tx1"/>
+              </a:solidFill>
+            </a:endParaRPr>
           </a:p>
           <a:p>
             <a:pPr marL="1257300" lvl="2" indent="-342900">
               <a:buFont typeface="Wingdings" charset="2"/>
               <a:buChar char="§"/>
             </a:pPr>
+            <a:r>
+              <a:rPr lang="en-US" sz="2800" dirty="0" smtClean="0">
+                <a:solidFill>
+                  <a:schemeClr val="tx1"/>
+                </a:solidFill>
+              </a:rPr>
+              <a:t>Windows: </a:t>
+            </a:r>
             <a:r>
               <a:rPr lang="en-US" sz="2800" dirty="0">
                 <a:solidFill>
                   <a:schemeClr val="tx1"/>
                 </a:solidFill>
               </a:rPr>
-              <a:t>Windows Phone: C# and Visual Studio</a:t>
+              <a:t>C# and Visual Studio</a:t>
             </a:r>
           </a:p>
         </p:txBody>
@@ -22907,7 +22928,7 @@
   <a:extraClrSchemeLst/>
   <a:extLst>
     <a:ext uri="{05A4C25C-085E-4340-85A3-A5531E510DB2}">
-      <thm15:themeFamily xmlns:thm15="http://schemas.microsoft.com/office/thememl/2012/main" xmlns="" name="Office Theme" id="{62F939B6-93AF-4DB8-9C6B-D6C7DFDC589F}" vid="{4A3C46E8-61CC-4603-A589-7422A47A8E4A}"/>
+      <thm15:themeFamily xmlns="" xmlns:thm15="http://schemas.microsoft.com/office/thememl/2012/main" name="Office Theme" id="{62F939B6-93AF-4DB8-9C6B-D6C7DFDC589F}" vid="{4A3C46E8-61CC-4603-A589-7422A47A8E4A}"/>
     </a:ext>
   </a:extLst>
 </a:theme>
@@ -23202,7 +23223,7 @@
   <a:extraClrSchemeLst/>
   <a:extLst>
     <a:ext uri="{05A4C25C-085E-4340-85A3-A5531E510DB2}">
-      <thm15:themeFamily xmlns:thm15="http://schemas.microsoft.com/office/thememl/2012/main" xmlns="" name="Office Theme" id="{62F939B6-93AF-4DB8-9C6B-D6C7DFDC589F}" vid="{4A3C46E8-61CC-4603-A589-7422A47A8E4A}"/>
+      <thm15:themeFamily xmlns="" xmlns:thm15="http://schemas.microsoft.com/office/thememl/2012/main" name="Office Theme" id="{62F939B6-93AF-4DB8-9C6B-D6C7DFDC589F}" vid="{4A3C46E8-61CC-4603-A589-7422A47A8E4A}"/>
     </a:ext>
   </a:extLst>
 </a:theme>

</xml_diff>